<commit_message>
Added roadmap graphic to poster
</commit_message>
<xml_diff>
--- a/01_documentation/nps_poster.pptx
+++ b/01_documentation/nps_poster.pptx
@@ -1669,7 +1669,7 @@
           <c:spPr>
             <a:ln w="28575" cap="rnd">
               <a:solidFill>
-                <a:schemeClr val="accent3"/>
+                <a:schemeClr val="bg1"/>
               </a:solidFill>
               <a:round/>
             </a:ln>
@@ -5551,6 +5551,74 @@
       </p:grpSpPr>
       <p:sp>
         <p:nvSpPr>
+          <p:cNvPr id="5" name="Rectangle: Rounded Corners 4">
+            <a:extLst>
+              <a:ext uri="{FF2B5EF4-FFF2-40B4-BE49-F238E27FC236}">
+                <a16:creationId xmlns:a16="http://schemas.microsoft.com/office/drawing/2014/main" id="{513C2097-B737-9E49-9609-F27FEABC1522}"/>
+              </a:ext>
+            </a:extLst>
+          </p:cNvPr>
+          <p:cNvSpPr/>
+          <p:nvPr/>
+        </p:nvSpPr>
+        <p:spPr>
+          <a:xfrm>
+            <a:off x="1797136" y="5139923"/>
+            <a:ext cx="1828801" cy="2321210"/>
+          </a:xfrm>
+          <a:prstGeom prst="roundRect">
+            <a:avLst>
+              <a:gd name="adj" fmla="val 0"/>
+            </a:avLst>
+          </a:prstGeom>
+          <a:solidFill>
+            <a:srgbClr val="5C3D00">
+              <a:alpha val="40000"/>
+            </a:srgbClr>
+          </a:solidFill>
+          <a:ln>
+            <a:noFill/>
+          </a:ln>
+        </p:spPr>
+        <p:style>
+          <a:lnRef idx="0">
+            <a:scrgbClr r="0" g="0" b="0"/>
+          </a:lnRef>
+          <a:fillRef idx="0">
+            <a:scrgbClr r="0" g="0" b="0"/>
+          </a:fillRef>
+          <a:effectRef idx="0">
+            <a:scrgbClr r="0" g="0" b="0"/>
+          </a:effectRef>
+          <a:fontRef idx="minor">
+            <a:schemeClr val="lt1"/>
+          </a:fontRef>
+        </p:style>
+        <p:txBody>
+          <a:bodyPr rtlCol="0" anchor="ctr"/>
+          <a:lstStyle/>
+          <a:p>
+            <a:pPr algn="ctr"/>
+            <a:endParaRPr lang="en-US" sz="1050" dirty="0">
+              <a:solidFill>
+                <a:schemeClr val="accent1"/>
+              </a:solidFill>
+              <a:latin typeface="+mj-lt"/>
+            </a:endParaRPr>
+          </a:p>
+          <a:p>
+            <a:pPr algn="ctr"/>
+            <a:endParaRPr lang="en-US" sz="1050" dirty="0">
+              <a:solidFill>
+                <a:schemeClr val="accent1"/>
+              </a:solidFill>
+              <a:latin typeface="+mj-lt"/>
+            </a:endParaRPr>
+          </a:p>
+        </p:txBody>
+      </p:sp>
+      <p:sp>
+        <p:nvSpPr>
           <p:cNvPr id="113" name="Rectangle: Rounded Corners 112">
             <a:extLst>
               <a:ext uri="{FF2B5EF4-FFF2-40B4-BE49-F238E27FC236}">
@@ -5563,8 +5631,8 @@
         </p:nvSpPr>
         <p:spPr>
           <a:xfrm>
-            <a:off x="3659095" y="7505706"/>
-            <a:ext cx="3874524" cy="2307657"/>
+            <a:off x="3668620" y="7496181"/>
+            <a:ext cx="3874524" cy="2321210"/>
           </a:xfrm>
           <a:prstGeom prst="roundRect">
             <a:avLst>
@@ -5710,7 +5778,7 @@
             <p:nvPr>
               <p:extLst>
                 <p:ext uri="{D42A27DB-BD31-4B8C-83A1-F6EECF244321}">
-                  <p14:modId xmlns:p14="http://schemas.microsoft.com/office/powerpoint/2010/main" val="1966781254"/>
+                  <p14:modId xmlns:p14="http://schemas.microsoft.com/office/powerpoint/2010/main" val="398764298"/>
                 </p:ext>
               </p:extLst>
             </p:nvPr>
@@ -8207,6 +8275,237 @@
           </a:fontRef>
         </p:style>
       </p:cxnSp>
+      <p:sp>
+        <p:nvSpPr>
+          <p:cNvPr id="22" name="TextBox 21">
+            <a:extLst>
+              <a:ext uri="{FF2B5EF4-FFF2-40B4-BE49-F238E27FC236}">
+                <a16:creationId xmlns:a16="http://schemas.microsoft.com/office/drawing/2014/main" id="{F38C92AA-E76F-5FA1-25EB-FA3D999972D0}"/>
+              </a:ext>
+            </a:extLst>
+          </p:cNvPr>
+          <p:cNvSpPr txBox="1"/>
+          <p:nvPr/>
+        </p:nvSpPr>
+        <p:spPr>
+          <a:xfrm>
+            <a:off x="243652" y="3278080"/>
+            <a:ext cx="1505705" cy="4185761"/>
+          </a:xfrm>
+          <a:prstGeom prst="rect">
+            <a:avLst/>
+          </a:prstGeom>
+          <a:solidFill>
+            <a:schemeClr val="accent1"/>
+          </a:solidFill>
+        </p:spPr>
+        <p:txBody>
+          <a:bodyPr wrap="square" lIns="108000" rtlCol="0">
+            <a:spAutoFit/>
+          </a:bodyPr>
+          <a:lstStyle/>
+          <a:p>
+            <a:pPr algn="ctr"/>
+            <a:endParaRPr lang="en-US" sz="1400" dirty="0">
+              <a:solidFill>
+                <a:srgbClr val="DBE8D4"/>
+              </a:solidFill>
+              <a:latin typeface="+mj-lt"/>
+            </a:endParaRPr>
+          </a:p>
+          <a:p>
+            <a:pPr algn="ctr"/>
+            <a:endParaRPr lang="en-US" sz="1400" dirty="0">
+              <a:solidFill>
+                <a:srgbClr val="DBE8D4"/>
+              </a:solidFill>
+              <a:latin typeface="+mj-lt"/>
+            </a:endParaRPr>
+          </a:p>
+          <a:p>
+            <a:pPr algn="ctr"/>
+            <a:endParaRPr lang="en-US" sz="1400" dirty="0">
+              <a:solidFill>
+                <a:srgbClr val="DBE8D4"/>
+              </a:solidFill>
+              <a:latin typeface="+mj-lt"/>
+            </a:endParaRPr>
+          </a:p>
+          <a:p>
+            <a:pPr algn="ctr"/>
+            <a:endParaRPr lang="en-US" sz="1400" dirty="0">
+              <a:solidFill>
+                <a:srgbClr val="DBE8D4"/>
+              </a:solidFill>
+              <a:latin typeface="+mj-lt"/>
+            </a:endParaRPr>
+          </a:p>
+          <a:p>
+            <a:pPr algn="ctr"/>
+            <a:endParaRPr lang="en-US" sz="1400" dirty="0">
+              <a:solidFill>
+                <a:srgbClr val="DBE8D4"/>
+              </a:solidFill>
+              <a:latin typeface="+mj-lt"/>
+            </a:endParaRPr>
+          </a:p>
+          <a:p>
+            <a:pPr algn="ctr"/>
+            <a:endParaRPr lang="en-US" sz="1400" dirty="0">
+              <a:solidFill>
+                <a:srgbClr val="DBE8D4"/>
+              </a:solidFill>
+              <a:latin typeface="+mj-lt"/>
+            </a:endParaRPr>
+          </a:p>
+          <a:p>
+            <a:pPr algn="ctr"/>
+            <a:endParaRPr lang="en-US" sz="1400" dirty="0">
+              <a:solidFill>
+                <a:srgbClr val="DBE8D4"/>
+              </a:solidFill>
+              <a:latin typeface="+mj-lt"/>
+            </a:endParaRPr>
+          </a:p>
+          <a:p>
+            <a:pPr algn="ctr"/>
+            <a:endParaRPr lang="en-US" sz="1400" dirty="0">
+              <a:solidFill>
+                <a:srgbClr val="DBE8D4"/>
+              </a:solidFill>
+              <a:latin typeface="+mj-lt"/>
+            </a:endParaRPr>
+          </a:p>
+          <a:p>
+            <a:pPr algn="ctr"/>
+            <a:endParaRPr lang="en-US" sz="1400" dirty="0">
+              <a:solidFill>
+                <a:srgbClr val="DBE8D4"/>
+              </a:solidFill>
+              <a:latin typeface="+mj-lt"/>
+            </a:endParaRPr>
+          </a:p>
+          <a:p>
+            <a:pPr algn="ctr"/>
+            <a:endParaRPr lang="en-US" sz="1400" dirty="0">
+              <a:solidFill>
+                <a:srgbClr val="DBE8D4"/>
+              </a:solidFill>
+              <a:latin typeface="+mj-lt"/>
+            </a:endParaRPr>
+          </a:p>
+          <a:p>
+            <a:pPr algn="ctr"/>
+            <a:endParaRPr lang="en-US" sz="1400" dirty="0">
+              <a:solidFill>
+                <a:srgbClr val="DBE8D4"/>
+              </a:solidFill>
+              <a:latin typeface="+mj-lt"/>
+            </a:endParaRPr>
+          </a:p>
+          <a:p>
+            <a:pPr algn="ctr"/>
+            <a:endParaRPr lang="en-US" sz="1400" dirty="0">
+              <a:solidFill>
+                <a:srgbClr val="DBE8D4"/>
+              </a:solidFill>
+              <a:latin typeface="+mj-lt"/>
+            </a:endParaRPr>
+          </a:p>
+          <a:p>
+            <a:pPr algn="ctr"/>
+            <a:endParaRPr lang="en-US" sz="1400" dirty="0">
+              <a:solidFill>
+                <a:srgbClr val="DBE8D4"/>
+              </a:solidFill>
+              <a:latin typeface="+mj-lt"/>
+            </a:endParaRPr>
+          </a:p>
+          <a:p>
+            <a:pPr algn="ctr"/>
+            <a:endParaRPr lang="en-US" sz="1400" dirty="0">
+              <a:solidFill>
+                <a:srgbClr val="DBE8D4"/>
+              </a:solidFill>
+              <a:latin typeface="+mj-lt"/>
+            </a:endParaRPr>
+          </a:p>
+          <a:p>
+            <a:pPr algn="ctr"/>
+            <a:endParaRPr lang="en-US" sz="1400" dirty="0">
+              <a:solidFill>
+                <a:srgbClr val="DBE8D4"/>
+              </a:solidFill>
+              <a:latin typeface="+mj-lt"/>
+            </a:endParaRPr>
+          </a:p>
+          <a:p>
+            <a:pPr algn="ctr"/>
+            <a:endParaRPr lang="en-US" sz="1400" dirty="0">
+              <a:solidFill>
+                <a:srgbClr val="DBE8D4"/>
+              </a:solidFill>
+              <a:latin typeface="+mj-lt"/>
+            </a:endParaRPr>
+          </a:p>
+          <a:p>
+            <a:pPr algn="ctr"/>
+            <a:endParaRPr lang="en-US" sz="1400" dirty="0">
+              <a:solidFill>
+                <a:srgbClr val="DBE8D4"/>
+              </a:solidFill>
+              <a:latin typeface="+mj-lt"/>
+            </a:endParaRPr>
+          </a:p>
+          <a:p>
+            <a:pPr algn="ctr"/>
+            <a:endParaRPr lang="en-US" sz="1400" dirty="0">
+              <a:solidFill>
+                <a:srgbClr val="DBE8D4"/>
+              </a:solidFill>
+              <a:latin typeface="+mj-lt"/>
+            </a:endParaRPr>
+          </a:p>
+          <a:p>
+            <a:pPr algn="ctr"/>
+            <a:endParaRPr lang="en-US" sz="1400" dirty="0">
+              <a:solidFill>
+                <a:srgbClr val="DBE8D4"/>
+              </a:solidFill>
+              <a:latin typeface="+mj-lt"/>
+            </a:endParaRPr>
+          </a:p>
+        </p:txBody>
+      </p:sp>
+      <p:pic>
+        <p:nvPicPr>
+          <p:cNvPr id="20" name="Picture 19">
+            <a:extLst>
+              <a:ext uri="{FF2B5EF4-FFF2-40B4-BE49-F238E27FC236}">
+                <a16:creationId xmlns:a16="http://schemas.microsoft.com/office/drawing/2014/main" id="{3C682BCB-6604-5FAA-D8E5-D38EFDB8A58C}"/>
+              </a:ext>
+            </a:extLst>
+          </p:cNvPr>
+          <p:cNvPicPr>
+            <a:picLocks noChangeAspect="1"/>
+          </p:cNvPicPr>
+          <p:nvPr/>
+        </p:nvPicPr>
+        <p:blipFill rotWithShape="1">
+          <a:blip r:embed="rId25"/>
+          <a:srcRect l="1776"/>
+          <a:stretch/>
+        </p:blipFill>
+        <p:spPr>
+          <a:xfrm>
+            <a:off x="254020" y="3245329"/>
+            <a:ext cx="1497064" cy="4215804"/>
+          </a:xfrm>
+          <a:prstGeom prst="rect">
+            <a:avLst/>
+          </a:prstGeom>
+        </p:spPr>
+      </p:pic>
     </p:spTree>
     <p:extLst>
       <p:ext uri="{BB962C8B-B14F-4D97-AF65-F5344CB8AC3E}">

</xml_diff>

<commit_message>
Updated project road map header on poster
</commit_message>
<xml_diff>
--- a/01_documentation/nps_poster.pptx
+++ b/01_documentation/nps_poster.pptx
@@ -8506,6 +8506,35 @@
           </a:prstGeom>
         </p:spPr>
       </p:pic>
+      <p:pic>
+        <p:nvPicPr>
+          <p:cNvPr id="14" name="Picture 13">
+            <a:extLst>
+              <a:ext uri="{FF2B5EF4-FFF2-40B4-BE49-F238E27FC236}">
+                <a16:creationId xmlns:a16="http://schemas.microsoft.com/office/drawing/2014/main" id="{B52ADDFC-43BB-86BE-7327-9AB1B0CDC3D5}"/>
+              </a:ext>
+            </a:extLst>
+          </p:cNvPr>
+          <p:cNvPicPr>
+            <a:picLocks noChangeAspect="1"/>
+          </p:cNvPicPr>
+          <p:nvPr/>
+        </p:nvPicPr>
+        <p:blipFill rotWithShape="1">
+          <a:blip r:embed="rId26"/>
+          <a:srcRect l="2580" t="275"/>
+          <a:stretch/>
+        </p:blipFill>
+        <p:spPr>
+          <a:xfrm>
+            <a:off x="260401" y="3257190"/>
+            <a:ext cx="1492213" cy="4185761"/>
+          </a:xfrm>
+          <a:prstGeom prst="rect">
+            <a:avLst/>
+          </a:prstGeom>
+        </p:spPr>
+      </p:pic>
     </p:spTree>
     <p:extLst>
       <p:ext uri="{BB962C8B-B14F-4D97-AF65-F5344CB8AC3E}">
@@ -9311,35 +9340,6 @@
 </file>
 
 <file path=customXml/item1.xml><?xml version="1.0" encoding="utf-8"?>
-<?mso-contentType ?>
-<FormTemplates xmlns="http://schemas.microsoft.com/sharepoint/v3/contenttype/forms">
-  <Display>DocumentLibraryForm</Display>
-  <Edit>DocumentLibraryForm</Edit>
-  <New>DocumentLibraryForm</New>
-</FormTemplates>
-</file>
-
-<file path=customXml/item2.xml><?xml version="1.0" encoding="utf-8"?>
-<p:properties xmlns:p="http://schemas.microsoft.com/office/2006/metadata/properties" xmlns:xsi="http://www.w3.org/2001/XMLSchema-instance" xmlns:pc="http://schemas.microsoft.com/office/infopath/2007/PartnerControls">
-  <documentManagement>
-    <_ip_UnifiedCompliancePolicyUIAction xmlns="http://schemas.microsoft.com/sharepoint/v3" xsi:nil="true"/>
-    <Image xmlns="71af3243-3dd4-4a8d-8c0d-dd76da1f02a5">
-      <Url xsi:nil="true"/>
-      <Description xsi:nil="true"/>
-    </Image>
-    <Status xmlns="71af3243-3dd4-4a8d-8c0d-dd76da1f02a5">Not started</Status>
-    <Background xmlns="71af3243-3dd4-4a8d-8c0d-dd76da1f02a5">false</Background>
-    <_ip_UnifiedCompliancePolicyProperties xmlns="http://schemas.microsoft.com/sharepoint/v3" xsi:nil="true"/>
-    <ImageTagsTaxHTField xmlns="71af3243-3dd4-4a8d-8c0d-dd76da1f02a5">
-      <Terms xmlns="http://schemas.microsoft.com/office/infopath/2007/PartnerControls"/>
-    </ImageTagsTaxHTField>
-    <TaxCatchAll xmlns="230e9df3-be65-4c73-a93b-d1236ebd677e" xsi:nil="true"/>
-    <MediaServiceKeyPoints xmlns="71af3243-3dd4-4a8d-8c0d-dd76da1f02a5" xsi:nil="true"/>
-  </documentManagement>
-</p:properties>
-</file>
-
-<file path=customXml/item3.xml><?xml version="1.0" encoding="utf-8"?>
 <ct:contentTypeSchema xmlns:ct="http://schemas.microsoft.com/office/2006/metadata/contentType" xmlns:ma="http://schemas.microsoft.com/office/2006/metadata/properties/metaAttributes" ct:_="" ma:_="" ma:contentTypeName="Document" ma:contentTypeID="0x01010079F111ED35F8CC479449609E8A0923A6" ma:contentTypeVersion="24" ma:contentTypeDescription="Create a new document." ma:contentTypeScope="" ma:versionID="2d714a3296df14eba7a100bb665443ca">
   <xsd:schema xmlns:xsd="http://www.w3.org/2001/XMLSchema" xmlns:xs="http://www.w3.org/2001/XMLSchema" xmlns:p="http://schemas.microsoft.com/office/2006/metadata/properties" xmlns:ns1="http://schemas.microsoft.com/sharepoint/v3" xmlns:ns2="71af3243-3dd4-4a8d-8c0d-dd76da1f02a5" xmlns:ns3="16c05727-aa75-4e4a-9b5f-8a80a1165891" xmlns:ns4="230e9df3-be65-4c73-a93b-d1236ebd677e" targetNamespace="http://schemas.microsoft.com/office/2006/metadata/properties" ma:root="true" ma:fieldsID="49549bf45bfbbfb6cffed527380e77e1" ns1:_="" ns2:_="" ns3:_="" ns4:_="">
     <xsd:import namespace="http://schemas.microsoft.com/sharepoint/v3"/>
@@ -9627,27 +9627,36 @@
 </ct:contentTypeSchema>
 </file>
 
-<file path=customXml/itemProps1.xml><?xml version="1.0" encoding="utf-8"?>
-<ds:datastoreItem xmlns:ds="http://schemas.openxmlformats.org/officeDocument/2006/customXml" ds:itemID="{ED504F61-D355-45F4-88A1-A506DA0E4DAD}">
-  <ds:schemaRefs>
-    <ds:schemaRef ds:uri="http://schemas.microsoft.com/sharepoint/v3/contenttype/forms"/>
-  </ds:schemaRefs>
-</ds:datastoreItem>
+<file path=customXml/item2.xml><?xml version="1.0" encoding="utf-8"?>
+<p:properties xmlns:p="http://schemas.microsoft.com/office/2006/metadata/properties" xmlns:xsi="http://www.w3.org/2001/XMLSchema-instance" xmlns:pc="http://schemas.microsoft.com/office/infopath/2007/PartnerControls">
+  <documentManagement>
+    <_ip_UnifiedCompliancePolicyUIAction xmlns="http://schemas.microsoft.com/sharepoint/v3" xsi:nil="true"/>
+    <Image xmlns="71af3243-3dd4-4a8d-8c0d-dd76da1f02a5">
+      <Url xsi:nil="true"/>
+      <Description xsi:nil="true"/>
+    </Image>
+    <Status xmlns="71af3243-3dd4-4a8d-8c0d-dd76da1f02a5">Not started</Status>
+    <Background xmlns="71af3243-3dd4-4a8d-8c0d-dd76da1f02a5">false</Background>
+    <_ip_UnifiedCompliancePolicyProperties xmlns="http://schemas.microsoft.com/sharepoint/v3" xsi:nil="true"/>
+    <ImageTagsTaxHTField xmlns="71af3243-3dd4-4a8d-8c0d-dd76da1f02a5">
+      <Terms xmlns="http://schemas.microsoft.com/office/infopath/2007/PartnerControls"/>
+    </ImageTagsTaxHTField>
+    <TaxCatchAll xmlns="230e9df3-be65-4c73-a93b-d1236ebd677e" xsi:nil="true"/>
+    <MediaServiceKeyPoints xmlns="71af3243-3dd4-4a8d-8c0d-dd76da1f02a5" xsi:nil="true"/>
+  </documentManagement>
+</p:properties>
 </file>
 
-<file path=customXml/itemProps2.xml><?xml version="1.0" encoding="utf-8"?>
-<ds:datastoreItem xmlns:ds="http://schemas.openxmlformats.org/officeDocument/2006/customXml" ds:itemID="{903CCD5C-1585-4363-9EFD-3AF69BA56376}">
-  <ds:schemaRefs>
-    <ds:schemaRef ds:uri="http://schemas.microsoft.com/office/2006/metadata/properties"/>
-    <ds:schemaRef ds:uri="http://schemas.microsoft.com/office/infopath/2007/PartnerControls"/>
-    <ds:schemaRef ds:uri="http://schemas.microsoft.com/sharepoint/v3"/>
-    <ds:schemaRef ds:uri="71af3243-3dd4-4a8d-8c0d-dd76da1f02a5"/>
-    <ds:schemaRef ds:uri="230e9df3-be65-4c73-a93b-d1236ebd677e"/>
-  </ds:schemaRefs>
-</ds:datastoreItem>
+<file path=customXml/item3.xml><?xml version="1.0" encoding="utf-8"?>
+<?mso-contentType ?>
+<FormTemplates xmlns="http://schemas.microsoft.com/sharepoint/v3/contenttype/forms">
+  <Display>DocumentLibraryForm</Display>
+  <Edit>DocumentLibraryForm</Edit>
+  <New>DocumentLibraryForm</New>
+</FormTemplates>
 </file>
 
-<file path=customXml/itemProps3.xml><?xml version="1.0" encoding="utf-8"?>
+<file path=customXml/itemProps1.xml><?xml version="1.0" encoding="utf-8"?>
 <ds:datastoreItem xmlns:ds="http://schemas.openxmlformats.org/officeDocument/2006/customXml" ds:itemID="{8966904C-BAED-4465-825E-748ECDB3F628}">
   <ds:schemaRefs>
     <ds:schemaRef ds:uri="http://schemas.microsoft.com/office/2006/metadata/contentType"/>
@@ -9666,4 +9675,24 @@
     <ds:schemaRef ds:uri="http://schemas.microsoft.com/internal/obd"/>
   </ds:schemaRefs>
 </ds:datastoreItem>
+</file>
+
+<file path=customXml/itemProps2.xml><?xml version="1.0" encoding="utf-8"?>
+<ds:datastoreItem xmlns:ds="http://schemas.openxmlformats.org/officeDocument/2006/customXml" ds:itemID="{903CCD5C-1585-4363-9EFD-3AF69BA56376}">
+  <ds:schemaRefs>
+    <ds:schemaRef ds:uri="http://schemas.microsoft.com/office/2006/metadata/properties"/>
+    <ds:schemaRef ds:uri="http://schemas.microsoft.com/office/infopath/2007/PartnerControls"/>
+    <ds:schemaRef ds:uri="http://schemas.microsoft.com/sharepoint/v3"/>
+    <ds:schemaRef ds:uri="71af3243-3dd4-4a8d-8c0d-dd76da1f02a5"/>
+    <ds:schemaRef ds:uri="230e9df3-be65-4c73-a93b-d1236ebd677e"/>
+  </ds:schemaRefs>
+</ds:datastoreItem>
+</file>
+
+<file path=customXml/itemProps3.xml><?xml version="1.0" encoding="utf-8"?>
+<ds:datastoreItem xmlns:ds="http://schemas.openxmlformats.org/officeDocument/2006/customXml" ds:itemID="{ED504F61-D355-45F4-88A1-A506DA0E4DAD}">
+  <ds:schemaRefs>
+    <ds:schemaRef ds:uri="http://schemas.microsoft.com/sharepoint/v3/contenttype/forms"/>
+  </ds:schemaRefs>
+</ds:datastoreItem>
 </file>
</xml_diff>

<commit_message>
Added flan t-5 to poster
</commit_message>
<xml_diff>
--- a/01_documentation/nps_poster.pptx
+++ b/01_documentation/nps_poster.pptx
@@ -2146,7 +2146,7 @@
               <a:lstStyle/>
               <a:p>
                 <a:pPr>
-                  <a:defRPr sz="1000" b="0" i="0" u="none" strike="noStrike" kern="1200" baseline="0">
+                  <a:defRPr lang="en-US" sz="1000" b="0" i="0" u="none" strike="noStrike" kern="1200" baseline="0">
                     <a:solidFill>
                       <a:schemeClr val="bg1"/>
                     </a:solidFill>
@@ -10655,48 +10655,9 @@
   </mc:AlternateContent>
   <c:chart>
     <c:autoTitleDeleted val="1"/>
-    <c:view3D>
-      <c:rotX val="15"/>
-      <c:rotY val="20"/>
-      <c:depthPercent val="100"/>
-      <c:rAngAx val="1"/>
-    </c:view3D>
-    <c:floor>
-      <c:thickness val="0"/>
-      <c:spPr>
-        <a:noFill/>
-        <a:ln>
-          <a:noFill/>
-        </a:ln>
-        <a:effectLst/>
-        <a:sp3d/>
-      </c:spPr>
-    </c:floor>
-    <c:sideWall>
-      <c:thickness val="0"/>
-      <c:spPr>
-        <a:noFill/>
-        <a:ln>
-          <a:noFill/>
-        </a:ln>
-        <a:effectLst/>
-        <a:sp3d/>
-      </c:spPr>
-    </c:sideWall>
-    <c:backWall>
-      <c:thickness val="0"/>
-      <c:spPr>
-        <a:noFill/>
-        <a:ln>
-          <a:noFill/>
-        </a:ln>
-        <a:effectLst/>
-        <a:sp3d/>
-      </c:spPr>
-    </c:backWall>
     <c:plotArea>
       <c:layout/>
-      <c:bar3DChart>
+      <c:barChart>
         <c:barDir val="bar"/>
         <c:grouping val="clustered"/>
         <c:varyColors val="0"/>
@@ -10705,181 +10666,193 @@
           <c:order val="0"/>
           <c:tx>
             <c:strRef>
-              <c:f>nps_top_parks!$B$1</c:f>
+              <c:f>Sheet1!$A$2</c:f>
               <c:strCache>
                 <c:ptCount val="1"/>
                 <c:pt idx="0">
-                  <c:v>RecreationVisits</c:v>
+                  <c:v>NLTK</c:v>
                 </c:pt>
               </c:strCache>
             </c:strRef>
           </c:tx>
           <c:spPr>
             <a:solidFill>
-              <a:schemeClr val="accent1"/>
+              <a:schemeClr val="accent6"/>
             </a:solidFill>
             <a:ln>
               <a:noFill/>
             </a:ln>
             <a:effectLst/>
-            <a:sp3d/>
           </c:spPr>
           <c:invertIfNegative val="0"/>
-          <c:dPt>
-            <c:idx val="0"/>
-            <c:invertIfNegative val="0"/>
-            <c:bubble3D val="0"/>
-            <c:spPr>
-              <a:solidFill>
-                <a:schemeClr val="accent3">
-                  <a:lumMod val="75000"/>
-                </a:schemeClr>
-              </a:solidFill>
-              <a:ln>
-                <a:noFill/>
-              </a:ln>
-              <a:effectLst/>
-              <a:sp3d/>
-            </c:spPr>
-            <c:extLst>
-              <c:ext xmlns:c16="http://schemas.microsoft.com/office/drawing/2014/chart" uri="{C3380CC4-5D6E-409C-BE32-E72D297353CC}">
-                <c16:uniqueId val="{00000005-00A7-494A-8AAB-86AF9DBD761F}"/>
-              </c:ext>
-            </c:extLst>
-          </c:dPt>
-          <c:dPt>
-            <c:idx val="1"/>
-            <c:invertIfNegative val="0"/>
-            <c:bubble3D val="0"/>
-            <c:spPr>
-              <a:solidFill>
-                <a:schemeClr val="accent2">
-                  <a:lumMod val="90000"/>
-                  <a:lumOff val="10000"/>
-                </a:schemeClr>
-              </a:solidFill>
-              <a:ln>
-                <a:noFill/>
-              </a:ln>
-              <a:effectLst/>
-              <a:sp3d/>
-            </c:spPr>
-            <c:extLst>
-              <c:ext xmlns:c16="http://schemas.microsoft.com/office/drawing/2014/chart" uri="{C3380CC4-5D6E-409C-BE32-E72D297353CC}">
-                <c16:uniqueId val="{00000004-00A7-494A-8AAB-86AF9DBD761F}"/>
-              </c:ext>
-            </c:extLst>
-          </c:dPt>
-          <c:dPt>
-            <c:idx val="2"/>
-            <c:invertIfNegative val="0"/>
-            <c:bubble3D val="0"/>
-            <c:spPr>
-              <a:solidFill>
-                <a:schemeClr val="accent5"/>
-              </a:solidFill>
-              <a:ln>
-                <a:noFill/>
-              </a:ln>
-              <a:effectLst/>
-              <a:sp3d/>
-            </c:spPr>
-            <c:extLst>
-              <c:ext xmlns:c16="http://schemas.microsoft.com/office/drawing/2014/chart" uri="{C3380CC4-5D6E-409C-BE32-E72D297353CC}">
-                <c16:uniqueId val="{00000003-00A7-494A-8AAB-86AF9DBD761F}"/>
-              </c:ext>
-            </c:extLst>
-          </c:dPt>
-          <c:dPt>
-            <c:idx val="3"/>
-            <c:invertIfNegative val="0"/>
-            <c:bubble3D val="0"/>
-            <c:spPr>
-              <a:solidFill>
-                <a:schemeClr val="accent6"/>
-              </a:solidFill>
-              <a:ln>
-                <a:noFill/>
-              </a:ln>
-              <a:effectLst/>
-              <a:sp3d/>
-            </c:spPr>
-            <c:extLst>
-              <c:ext xmlns:c16="http://schemas.microsoft.com/office/drawing/2014/chart" uri="{C3380CC4-5D6E-409C-BE32-E72D297353CC}">
-                <c16:uniqueId val="{00000002-00A7-494A-8AAB-86AF9DBD761F}"/>
-              </c:ext>
-            </c:extLst>
-          </c:dPt>
-          <c:dPt>
-            <c:idx val="4"/>
-            <c:invertIfNegative val="0"/>
-            <c:bubble3D val="0"/>
-            <c:spPr>
-              <a:solidFill>
-                <a:schemeClr val="accent2"/>
-              </a:solidFill>
-              <a:ln>
-                <a:noFill/>
-              </a:ln>
-              <a:effectLst/>
-              <a:sp3d/>
-            </c:spPr>
-            <c:extLst>
-              <c:ext xmlns:c16="http://schemas.microsoft.com/office/drawing/2014/chart" uri="{C3380CC4-5D6E-409C-BE32-E72D297353CC}">
-                <c16:uniqueId val="{00000001-00A7-494A-8AAB-86AF9DBD761F}"/>
-              </c:ext>
-            </c:extLst>
-          </c:dPt>
           <c:cat>
             <c:strRef>
-              <c:f>nps_top_parks!$A$2:$A$6</c:f>
+              <c:f>Sheet1!$B$1:$D$1</c:f>
               <c:strCache>
-                <c:ptCount val="5"/>
+                <c:ptCount val="3"/>
                 <c:pt idx="0">
-                  <c:v>Rocky Mountain</c:v>
+                  <c:v>Intent</c:v>
                 </c:pt>
                 <c:pt idx="1">
-                  <c:v>Yellowstone</c:v>
+                  <c:v>Endpoint</c:v>
                 </c:pt>
                 <c:pt idx="2">
-                  <c:v>Zion</c:v>
-                </c:pt>
-                <c:pt idx="3">
-                  <c:v>Grand Canyon</c:v>
-                </c:pt>
-                <c:pt idx="4">
-                  <c:v>Great Smoky Mountains</c:v>
+                  <c:v>Parkcode</c:v>
                 </c:pt>
               </c:strCache>
             </c:strRef>
           </c:cat>
           <c:val>
             <c:numRef>
-              <c:f>nps_top_parks!$B$2:$B$6</c:f>
+              <c:f>Sheet1!$B$2:$D$2</c:f>
               <c:numCache>
-                <c:formatCode>General</c:formatCode>
-                <c:ptCount val="5"/>
+                <c:formatCode>0%</c:formatCode>
+                <c:ptCount val="3"/>
                 <c:pt idx="0">
-                  <c:v>4115837</c:v>
+                  <c:v>0.02</c:v>
                 </c:pt>
                 <c:pt idx="1">
-                  <c:v>4501382</c:v>
+                  <c:v>0.27</c:v>
                 </c:pt>
                 <c:pt idx="2">
-                  <c:v>4623238</c:v>
-                </c:pt>
-                <c:pt idx="3">
-                  <c:v>4733705</c:v>
-                </c:pt>
-                <c:pt idx="4">
-                  <c:v>13297647</c:v>
+                  <c:v>0.46</c:v>
                 </c:pt>
               </c:numCache>
             </c:numRef>
           </c:val>
           <c:extLst>
             <c:ext xmlns:c16="http://schemas.microsoft.com/office/drawing/2014/chart" uri="{C3380CC4-5D6E-409C-BE32-E72D297353CC}">
-              <c16:uniqueId val="{00000000-D440-44AA-B150-AEBB373228E8}"/>
+              <c16:uniqueId val="{00000000-7D65-4019-9A02-D97277BBC9D4}"/>
+            </c:ext>
+          </c:extLst>
+        </c:ser>
+        <c:ser>
+          <c:idx val="1"/>
+          <c:order val="1"/>
+          <c:tx>
+            <c:strRef>
+              <c:f>Sheet1!$A$3</c:f>
+              <c:strCache>
+                <c:ptCount val="1"/>
+                <c:pt idx="0">
+                  <c:v>SpaCy</c:v>
+                </c:pt>
+              </c:strCache>
+            </c:strRef>
+          </c:tx>
+          <c:spPr>
+            <a:solidFill>
+              <a:schemeClr val="accent5"/>
+            </a:solidFill>
+            <a:ln>
+              <a:noFill/>
+            </a:ln>
+            <a:effectLst/>
+          </c:spPr>
+          <c:invertIfNegative val="0"/>
+          <c:cat>
+            <c:strRef>
+              <c:f>Sheet1!$B$1:$D$1</c:f>
+              <c:strCache>
+                <c:ptCount val="3"/>
+                <c:pt idx="0">
+                  <c:v>Intent</c:v>
+                </c:pt>
+                <c:pt idx="1">
+                  <c:v>Endpoint</c:v>
+                </c:pt>
+                <c:pt idx="2">
+                  <c:v>Parkcode</c:v>
+                </c:pt>
+              </c:strCache>
+            </c:strRef>
+          </c:cat>
+          <c:val>
+            <c:numRef>
+              <c:f>Sheet1!$B$3:$D$3</c:f>
+              <c:numCache>
+                <c:formatCode>0%</c:formatCode>
+                <c:ptCount val="3"/>
+                <c:pt idx="0">
+                  <c:v>0.02</c:v>
+                </c:pt>
+                <c:pt idx="1">
+                  <c:v>0.27</c:v>
+                </c:pt>
+                <c:pt idx="2">
+                  <c:v>0.56999999999999995</c:v>
+                </c:pt>
+              </c:numCache>
+            </c:numRef>
+          </c:val>
+          <c:extLst>
+            <c:ext xmlns:c16="http://schemas.microsoft.com/office/drawing/2014/chart" uri="{C3380CC4-5D6E-409C-BE32-E72D297353CC}">
+              <c16:uniqueId val="{00000001-7D65-4019-9A02-D97277BBC9D4}"/>
+            </c:ext>
+          </c:extLst>
+        </c:ser>
+        <c:ser>
+          <c:idx val="2"/>
+          <c:order val="2"/>
+          <c:tx>
+            <c:strRef>
+              <c:f>Sheet1!$A$4</c:f>
+              <c:strCache>
+                <c:ptCount val="1"/>
+                <c:pt idx="0">
+                  <c:v>GPT</c:v>
+                </c:pt>
+              </c:strCache>
+            </c:strRef>
+          </c:tx>
+          <c:spPr>
+            <a:solidFill>
+              <a:schemeClr val="accent2"/>
+            </a:solidFill>
+            <a:ln>
+              <a:noFill/>
+            </a:ln>
+            <a:effectLst/>
+          </c:spPr>
+          <c:invertIfNegative val="0"/>
+          <c:cat>
+            <c:strRef>
+              <c:f>Sheet1!$B$1:$D$1</c:f>
+              <c:strCache>
+                <c:ptCount val="3"/>
+                <c:pt idx="0">
+                  <c:v>Intent</c:v>
+                </c:pt>
+                <c:pt idx="1">
+                  <c:v>Endpoint</c:v>
+                </c:pt>
+                <c:pt idx="2">
+                  <c:v>Parkcode</c:v>
+                </c:pt>
+              </c:strCache>
+            </c:strRef>
+          </c:cat>
+          <c:val>
+            <c:numRef>
+              <c:f>Sheet1!$B$4:$D$4</c:f>
+              <c:numCache>
+                <c:formatCode>0%</c:formatCode>
+                <c:ptCount val="3"/>
+                <c:pt idx="0">
+                  <c:v>1</c:v>
+                </c:pt>
+                <c:pt idx="1">
+                  <c:v>0.91</c:v>
+                </c:pt>
+                <c:pt idx="2">
+                  <c:v>0.98</c:v>
+                </c:pt>
+              </c:numCache>
+            </c:numRef>
+          </c:val>
+          <c:extLst>
+            <c:ext xmlns:c16="http://schemas.microsoft.com/office/drawing/2014/chart" uri="{C3380CC4-5D6E-409C-BE32-E72D297353CC}">
+              <c16:uniqueId val="{00000002-7D65-4019-9A02-D97277BBC9D4}"/>
             </c:ext>
           </c:extLst>
         </c:ser>
@@ -10891,27 +10864,32 @@
           <c:showPercent val="0"/>
           <c:showBubbleSize val="0"/>
         </c:dLbls>
-        <c:gapWidth val="150"/>
-        <c:shape val="box"/>
-        <c:axId val="782632592"/>
-        <c:axId val="782632952"/>
-        <c:axId val="0"/>
-      </c:bar3DChart>
+        <c:gapWidth val="100"/>
+        <c:overlap val="-16"/>
+        <c:axId val="468199712"/>
+        <c:axId val="534505448"/>
+      </c:barChart>
       <c:catAx>
-        <c:axId val="782632592"/>
+        <c:axId val="468199712"/>
         <c:scaling>
           <c:orientation val="minMax"/>
         </c:scaling>
         <c:delete val="0"/>
         <c:axPos val="l"/>
         <c:numFmt formatCode="General" sourceLinked="1"/>
-        <c:majorTickMark val="none"/>
+        <c:majorTickMark val="out"/>
         <c:minorTickMark val="none"/>
         <c:tickLblPos val="nextTo"/>
         <c:spPr>
           <a:noFill/>
-          <a:ln>
-            <a:noFill/>
+          <a:ln w="9525" cap="flat" cmpd="sng" algn="ctr">
+            <a:solidFill>
+              <a:schemeClr val="tx1">
+                <a:lumMod val="15000"/>
+                <a:lumOff val="85000"/>
+              </a:schemeClr>
+            </a:solidFill>
+            <a:round/>
           </a:ln>
           <a:effectLst/>
         </c:spPr>
@@ -10920,7 +10898,7 @@
           <a:lstStyle/>
           <a:p>
             <a:pPr>
-              <a:defRPr sz="1050" b="0" i="0" u="none" strike="noStrike" kern="1200" cap="none" spc="0" normalizeH="0" baseline="0">
+              <a:defRPr sz="900" b="0" i="0" u="none" strike="noStrike" kern="1200" cap="none" spc="0" normalizeH="0" baseline="0">
                 <a:solidFill>
                   <a:schemeClr val="bg1"/>
                 </a:solidFill>
@@ -10932,7 +10910,7 @@
             <a:endParaRPr lang="en-US"/>
           </a:p>
         </c:txPr>
-        <c:crossAx val="782632952"/>
+        <c:crossAx val="534505448"/>
         <c:crosses val="autoZero"/>
         <c:auto val="1"/>
         <c:lblAlgn val="ctr"/>
@@ -10940,9 +10918,10 @@
         <c:noMultiLvlLbl val="0"/>
       </c:catAx>
       <c:valAx>
-        <c:axId val="782632952"/>
+        <c:axId val="534505448"/>
         <c:scaling>
           <c:orientation val="minMax"/>
+          <c:max val="1"/>
         </c:scaling>
         <c:delete val="0"/>
         <c:axPos val="b"/>
@@ -10974,7 +10953,7 @@
             <a:effectLst/>
           </c:spPr>
         </c:minorGridlines>
-        <c:numFmt formatCode="General" sourceLinked="1"/>
+        <c:numFmt formatCode="0%" sourceLinked="1"/>
         <c:majorTickMark val="none"/>
         <c:minorTickMark val="none"/>
         <c:tickLblPos val="nextTo"/>
@@ -10990,7 +10969,7 @@
           <a:lstStyle/>
           <a:p>
             <a:pPr>
-              <a:defRPr sz="1197" b="0" i="0" u="none" strike="noStrike" kern="1200" baseline="0">
+              <a:defRPr sz="900" b="0" i="0" u="none" strike="noStrike" kern="1200" baseline="0">
                 <a:solidFill>
                   <a:schemeClr val="bg1"/>
                 </a:solidFill>
@@ -11002,72 +10981,9 @@
             <a:endParaRPr lang="en-US"/>
           </a:p>
         </c:txPr>
-        <c:crossAx val="782632592"/>
+        <c:crossAx val="468199712"/>
         <c:crosses val="autoZero"/>
         <c:crossBetween val="between"/>
-        <c:dispUnits>
-          <c:builtInUnit val="millions"/>
-          <c:dispUnitsLbl>
-            <c:layout>
-              <c:manualLayout>
-                <c:xMode val="edge"/>
-                <c:yMode val="edge"/>
-                <c:x val="0.45167692283668487"/>
-                <c:y val="0.83229867181340778"/>
-              </c:manualLayout>
-            </c:layout>
-            <c:tx>
-              <c:rich>
-                <a:bodyPr rot="0" spcFirstLastPara="1" vertOverflow="ellipsis" vert="horz" wrap="square" anchor="ctr" anchorCtr="1"/>
-                <a:lstStyle/>
-                <a:p>
-                  <a:pPr>
-                    <a:defRPr sz="1197" b="0" i="0" u="none" strike="noStrike" kern="1200" cap="all" baseline="0">
-                      <a:solidFill>
-                        <a:schemeClr val="bg1"/>
-                      </a:solidFill>
-                      <a:latin typeface="+mn-lt"/>
-                      <a:ea typeface="+mn-ea"/>
-                      <a:cs typeface="+mn-cs"/>
-                    </a:defRPr>
-                  </a:pPr>
-                  <a:r>
-                    <a:rPr lang="en-US" dirty="0">
-                      <a:solidFill>
-                        <a:schemeClr val="bg1"/>
-                      </a:solidFill>
-                    </a:rPr>
-                    <a:t>Visits (Millions)</a:t>
-                  </a:r>
-                </a:p>
-              </c:rich>
-            </c:tx>
-            <c:spPr>
-              <a:noFill/>
-              <a:ln>
-                <a:noFill/>
-              </a:ln>
-              <a:effectLst/>
-            </c:spPr>
-            <c:txPr>
-              <a:bodyPr rot="0" spcFirstLastPara="1" vertOverflow="ellipsis" vert="horz" wrap="square" anchor="ctr" anchorCtr="1"/>
-              <a:lstStyle/>
-              <a:p>
-                <a:pPr>
-                  <a:defRPr sz="1197" b="0" i="0" u="none" strike="noStrike" kern="1200" cap="all" baseline="0">
-                    <a:solidFill>
-                      <a:schemeClr val="bg1"/>
-                    </a:solidFill>
-                    <a:latin typeface="+mn-lt"/>
-                    <a:ea typeface="+mn-ea"/>
-                    <a:cs typeface="+mn-cs"/>
-                  </a:defRPr>
-                </a:pPr>
-                <a:endParaRPr lang="en-US"/>
-              </a:p>
-            </c:txPr>
-          </c:dispUnitsLbl>
-        </c:dispUnits>
       </c:valAx>
       <c:spPr>
         <a:noFill/>
@@ -11077,6 +10993,47 @@
         <a:effectLst/>
       </c:spPr>
     </c:plotArea>
+    <c:legend>
+      <c:legendPos val="t"/>
+      <c:layout>
+        <c:manualLayout>
+          <c:xMode val="edge"/>
+          <c:yMode val="edge"/>
+          <c:x val="0.56734603853487464"/>
+          <c:y val="3.2047108249050354E-2"/>
+          <c:w val="0.35566197987555592"/>
+          <c:h val="0.11682086375761527"/>
+        </c:manualLayout>
+      </c:layout>
+      <c:overlay val="0"/>
+      <c:spPr>
+        <a:noFill/>
+        <a:ln>
+          <a:noFill/>
+        </a:ln>
+        <a:effectLst/>
+      </c:spPr>
+      <c:txPr>
+        <a:bodyPr rot="0" spcFirstLastPara="1" vertOverflow="ellipsis" vert="horz" wrap="square" anchor="ctr" anchorCtr="1"/>
+        <a:lstStyle/>
+        <a:p>
+          <a:pPr>
+            <a:defRPr sz="900" b="0" i="0" u="none" strike="noStrike" kern="1200" baseline="0">
+              <a:solidFill>
+                <a:schemeClr val="tx1">
+                  <a:lumMod val="65000"/>
+                  <a:lumOff val="35000"/>
+                </a:schemeClr>
+              </a:solidFill>
+              <a:latin typeface="+mn-lt"/>
+              <a:ea typeface="+mn-ea"/>
+              <a:cs typeface="+mn-cs"/>
+            </a:defRPr>
+          </a:pPr>
+          <a:endParaRPr lang="en-US"/>
+        </a:p>
+      </c:txPr>
+    </c:legend>
     <c:plotVisOnly val="1"/>
     <c:dispBlanksAs val="gap"/>
     <c:extLst>
@@ -25749,7 +25706,7 @@
 </file>
 
 <file path=ppt/charts/style2.xml><?xml version="1.0" encoding="utf-8"?>
-<cs:chartStyle xmlns:cs="http://schemas.microsoft.com/office/drawing/2012/chartStyle" xmlns:a="http://schemas.openxmlformats.org/drawingml/2006/main" id="296">
+<cs:chartStyle xmlns:cs="http://schemas.microsoft.com/office/drawing/2012/chartStyle" xmlns:a="http://schemas.openxmlformats.org/drawingml/2006/main" id="225">
   <cs:axisTitle>
     <cs:lnRef idx="0"/>
     <cs:fillRef idx="0"/>
@@ -25760,7 +25717,7 @@
         <a:lumOff val="35000"/>
       </a:schemeClr>
     </cs:fontRef>
-    <cs:defRPr sz="1197" kern="1200" cap="all"/>
+    <cs:defRPr sz="900" kern="1200" cap="all"/>
   </cs:axisTitle>
   <cs:categoryAxis>
     <cs:lnRef idx="0"/>
@@ -25772,7 +25729,18 @@
         <a:lumOff val="35000"/>
       </a:schemeClr>
     </cs:fontRef>
-    <cs:defRPr sz="1197" b="0" kern="1200" cap="none" spc="0" normalizeH="0" baseline="0"/>
+    <cs:spPr>
+      <a:ln w="9525" cap="flat" cmpd="sng" algn="ctr">
+        <a:solidFill>
+          <a:schemeClr val="tx1">
+            <a:lumMod val="15000"/>
+            <a:lumOff val="85000"/>
+          </a:schemeClr>
+        </a:solidFill>
+        <a:round/>
+      </a:ln>
+    </cs:spPr>
+    <cs:defRPr sz="900" b="0" kern="1200" cap="none" spc="0" normalizeH="0" baseline="0"/>
   </cs:categoryAxis>
   <cs:chartArea mods="allowNoFillOverride allowNoLineOverride">
     <cs:lnRef idx="0"/>
@@ -25795,7 +25763,7 @@
         <a:round/>
       </a:ln>
     </cs:spPr>
-    <cs:defRPr sz="1197" kern="1200"/>
+    <cs:defRPr sz="900" kern="1200"/>
   </cs:chartArea>
   <cs:dataLabel>
     <cs:lnRef idx="0"/>
@@ -25807,7 +25775,7 @@
         <a:lumOff val="25000"/>
       </a:schemeClr>
     </cs:fontRef>
-    <cs:defRPr sz="1197" kern="1200"/>
+    <cs:defRPr sz="900" kern="1200"/>
   </cs:dataLabel>
   <cs:dataLabelCallout>
     <cs:lnRef idx="0"/>
@@ -25827,7 +25795,7 @@
         </a:schemeClr>
       </a:solidFill>
     </cs:spPr>
-    <cs:defRPr sz="1197" kern="1200"/>
+    <cs:defRPr sz="900" kern="1200"/>
     <cs:bodyPr rot="0" spcFirstLastPara="1" vertOverflow="clip" horzOverflow="clip" vert="horz" wrap="square" lIns="36576" tIns="18288" rIns="36576" bIns="18288" anchor="ctr" anchorCtr="1">
       <a:spAutoFit/>
     </cs:bodyPr>
@@ -25934,7 +25902,7 @@
         </a:solidFill>
       </a:ln>
     </cs:spPr>
-    <cs:defRPr sz="1197" kern="1200"/>
+    <cs:defRPr sz="900" kern="1200"/>
   </cs:dataTable>
   <cs:downBar>
     <cs:lnRef idx="0"/>
@@ -26091,7 +26059,7 @@
         <a:lumOff val="35000"/>
       </a:schemeClr>
     </cs:fontRef>
-    <cs:defRPr sz="1197" kern="1200"/>
+    <cs:defRPr sz="900" kern="1200"/>
   </cs:legend>
   <cs:plotArea mods="allowNoFillOverride allowNoLineOverride">
     <cs:lnRef idx="0"/>
@@ -26130,7 +26098,7 @@
         <a:round/>
       </a:ln>
     </cs:spPr>
-    <cs:defRPr sz="1197" kern="1200"/>
+    <cs:defRPr sz="900" kern="1200"/>
   </cs:seriesAxis>
   <cs:seriesLine>
     <cs:lnRef idx="0"/>
@@ -26161,7 +26129,7 @@
         <a:lumOff val="35000"/>
       </a:schemeClr>
     </cs:fontRef>
-    <cs:defRPr sz="2200" b="0" kern="1200" cap="none" spc="0" normalizeH="0" baseline="0"/>
+    <cs:defRPr sz="2000" b="0" kern="1200" cap="none" spc="0" normalizeH="0" baseline="0"/>
   </cs:title>
   <cs:trendline>
     <cs:lnRef idx="0">
@@ -26191,7 +26159,7 @@
         <a:lumOff val="35000"/>
       </a:schemeClr>
     </cs:fontRef>
-    <cs:defRPr sz="1197" kern="1200"/>
+    <cs:defRPr sz="900" kern="1200"/>
   </cs:trendlineLabel>
   <cs:upBar>
     <cs:lnRef idx="0"/>
@@ -26224,7 +26192,7 @@
         <a:lumOff val="35000"/>
       </a:schemeClr>
     </cs:fontRef>
-    <cs:defRPr sz="1197" kern="1200"/>
+    <cs:defRPr sz="900" kern="1200"/>
   </cs:valueAxis>
   <cs:wall>
     <cs:lnRef idx="0"/>
@@ -29862,7 +29830,7 @@
           <a:p>
             <a:fld id="{BD56B3A9-68BD-4D54-A0BB-B455B6E4AFF4}" type="datetimeFigureOut">
               <a:rPr lang="en-US" smtClean="0"/>
-              <a:t>7/12/2024</a:t>
+              <a:t>7/16/2024</a:t>
             </a:fld>
             <a:endParaRPr lang="en-US" dirty="0"/>
           </a:p>
@@ -30039,7 +30007,7 @@
           <a:p>
             <a:fld id="{C55816F1-3F18-45AF-B31A-ADFF417588A1}" type="datetimeFigureOut">
               <a:rPr lang="en-US" smtClean="0"/>
-              <a:t>7/12/2024</a:t>
+              <a:t>7/16/2024</a:t>
             </a:fld>
             <a:endParaRPr lang="en-US" dirty="0"/>
           </a:p>
@@ -30846,7 +30814,7 @@
           <a:p>
             <a:fld id="{A8FAED0E-297D-480F-9176-00B6D6CDE081}" type="datetimeFigureOut">
               <a:rPr lang="en-US" noProof="0" smtClean="0"/>
-              <a:t>7/12/2024</a:t>
+              <a:t>7/16/2024</a:t>
             </a:fld>
             <a:endParaRPr lang="en-US" noProof="0" dirty="0"/>
           </a:p>
@@ -31770,55 +31738,6 @@
       </p:sp>
       <p:sp>
         <p:nvSpPr>
-          <p:cNvPr id="16" name="Rectangle 15">
-            <a:extLst>
-              <a:ext uri="{FF2B5EF4-FFF2-40B4-BE49-F238E27FC236}">
-                <a16:creationId xmlns:a16="http://schemas.microsoft.com/office/drawing/2014/main" id="{607E32E9-8361-C08B-35ED-4C79EF679E63}"/>
-              </a:ext>
-            </a:extLst>
-          </p:cNvPr>
-          <p:cNvSpPr/>
-          <p:nvPr/>
-        </p:nvSpPr>
-        <p:spPr>
-          <a:xfrm>
-            <a:off x="235926" y="7496147"/>
-            <a:ext cx="3631941" cy="2315269"/>
-          </a:xfrm>
-          <a:prstGeom prst="rect">
-            <a:avLst/>
-          </a:prstGeom>
-          <a:ln>
-            <a:noFill/>
-          </a:ln>
-        </p:spPr>
-        <p:style>
-          <a:lnRef idx="2">
-            <a:schemeClr val="accent1">
-              <a:shade val="15000"/>
-            </a:schemeClr>
-          </a:lnRef>
-          <a:fillRef idx="1">
-            <a:schemeClr val="accent1"/>
-          </a:fillRef>
-          <a:effectRef idx="0">
-            <a:schemeClr val="accent1"/>
-          </a:effectRef>
-          <a:fontRef idx="minor">
-            <a:schemeClr val="lt1"/>
-          </a:fontRef>
-        </p:style>
-        <p:txBody>
-          <a:bodyPr rtlCol="0" anchor="ctr"/>
-          <a:lstStyle/>
-          <a:p>
-            <a:pPr algn="ctr"/>
-            <a:endParaRPr lang="en-US"/>
-          </a:p>
-        </p:txBody>
-      </p:sp>
-      <p:sp>
-        <p:nvSpPr>
           <p:cNvPr id="102" name="TextBox 101">
             <a:extLst>
               <a:ext uri="{FF2B5EF4-FFF2-40B4-BE49-F238E27FC236}">
@@ -34340,22 +34259,13 @@
           <a:p>
             <a:pPr algn="ctr"/>
             <a:r>
-              <a:rPr lang="en-US" sz="1400" dirty="0" err="1">
-                <a:solidFill>
-                  <a:schemeClr val="accent1"/>
-                </a:solidFill>
-                <a:latin typeface="+mj-lt"/>
-              </a:rPr>
-              <a:t>SpaCy</a:t>
-            </a:r>
-            <a:r>
               <a:rPr lang="en-US" sz="1400" dirty="0">
                 <a:solidFill>
                   <a:schemeClr val="accent1"/>
                 </a:solidFill>
                 <a:latin typeface="+mj-lt"/>
               </a:rPr>
-              <a:t> &amp; NLTK</a:t>
+              <a:t>FLAN-T5</a:t>
             </a:r>
           </a:p>
         </p:txBody>
@@ -34613,7 +34523,7 @@
                 <p:nvPr>
                   <p:extLst>
                     <p:ext uri="{D42A27DB-BD31-4B8C-83A1-F6EECF244321}">
-                      <p14:modId xmlns:p14="http://schemas.microsoft.com/office/powerpoint/2010/main" val="724586276"/>
+                      <p14:modId xmlns:p14="http://schemas.microsoft.com/office/powerpoint/2010/main" val="1688637758"/>
                     </p:ext>
                   </p:extLst>
                 </p:nvPr>
@@ -34877,7 +34787,7 @@
         </p:nvSpPr>
         <p:spPr>
           <a:xfrm>
-            <a:off x="235926" y="7497695"/>
+            <a:off x="242276" y="7497695"/>
             <a:ext cx="3635675" cy="2320209"/>
           </a:xfrm>
           <a:prstGeom prst="rect">
@@ -34917,97 +34827,6 @@
           </a:p>
         </p:txBody>
       </p:sp>
-      <p:grpSp>
-        <p:nvGrpSpPr>
-          <p:cNvPr id="106" name="Group 105">
-            <a:extLst>
-              <a:ext uri="{FF2B5EF4-FFF2-40B4-BE49-F238E27FC236}">
-                <a16:creationId xmlns:a16="http://schemas.microsoft.com/office/drawing/2014/main" id="{42157EB8-8FBB-72AD-F327-1FB5D87C2048}"/>
-              </a:ext>
-            </a:extLst>
-          </p:cNvPr>
-          <p:cNvGrpSpPr/>
-          <p:nvPr/>
-        </p:nvGrpSpPr>
-        <p:grpSpPr>
-          <a:xfrm>
-            <a:off x="139841" y="7469612"/>
-            <a:ext cx="4162535" cy="2491176"/>
-            <a:chOff x="5085692" y="6609453"/>
-            <a:chExt cx="4162535" cy="2491176"/>
-          </a:xfrm>
-        </p:grpSpPr>
-        <p:graphicFrame>
-          <p:nvGraphicFramePr>
-            <p:cNvPr id="31" name="Chart 30">
-              <a:extLst>
-                <a:ext uri="{FF2B5EF4-FFF2-40B4-BE49-F238E27FC236}">
-                  <a16:creationId xmlns:a16="http://schemas.microsoft.com/office/drawing/2014/main" id="{361831A2-AE36-A0DE-755E-CA3F84184158}"/>
-                </a:ext>
-              </a:extLst>
-            </p:cNvPr>
-            <p:cNvGraphicFramePr>
-              <a:graphicFrameLocks/>
-            </p:cNvGraphicFramePr>
-            <p:nvPr>
-              <p:extLst>
-                <p:ext uri="{D42A27DB-BD31-4B8C-83A1-F6EECF244321}">
-                  <p14:modId xmlns:p14="http://schemas.microsoft.com/office/powerpoint/2010/main" val="1515885975"/>
-                </p:ext>
-              </p:extLst>
-            </p:nvPr>
-          </p:nvGraphicFramePr>
-          <p:xfrm>
-            <a:off x="5085692" y="6779419"/>
-            <a:ext cx="4162535" cy="2321210"/>
-          </p:xfrm>
-          <a:graphic>
-            <a:graphicData uri="http://schemas.openxmlformats.org/drawingml/2006/chart">
-              <c:chart xmlns:c="http://schemas.openxmlformats.org/drawingml/2006/chart" xmlns:r="http://schemas.openxmlformats.org/officeDocument/2006/relationships" r:id="rId25"/>
-            </a:graphicData>
-          </a:graphic>
-        </p:graphicFrame>
-        <p:sp>
-          <p:nvSpPr>
-            <p:cNvPr id="44" name="TextBox 43">
-              <a:extLst>
-                <a:ext uri="{FF2B5EF4-FFF2-40B4-BE49-F238E27FC236}">
-                  <a16:creationId xmlns:a16="http://schemas.microsoft.com/office/drawing/2014/main" id="{CCCC5E7E-38DF-4597-9D6B-6061E22EFA2E}"/>
-                </a:ext>
-              </a:extLst>
-            </p:cNvPr>
-            <p:cNvSpPr txBox="1"/>
-            <p:nvPr/>
-          </p:nvSpPr>
-          <p:spPr>
-            <a:xfrm>
-              <a:off x="5122020" y="6609453"/>
-              <a:ext cx="3162590" cy="307777"/>
-            </a:xfrm>
-            <a:prstGeom prst="rect">
-              <a:avLst/>
-            </a:prstGeom>
-            <a:noFill/>
-          </p:spPr>
-          <p:txBody>
-            <a:bodyPr wrap="square" rtlCol="0">
-              <a:spAutoFit/>
-            </a:bodyPr>
-            <a:lstStyle/>
-            <a:p>
-              <a:r>
-                <a:rPr lang="en-US" sz="1400" dirty="0">
-                  <a:solidFill>
-                    <a:schemeClr val="bg1"/>
-                  </a:solidFill>
-                  <a:latin typeface="+mj-lt"/>
-                </a:rPr>
-                <a:t>Top 5 National Parks 2023</a:t>
-              </a:r>
-            </a:p>
-          </p:txBody>
-        </p:sp>
-      </p:grpSp>
       <p:pic>
         <p:nvPicPr>
           <p:cNvPr id="39" name="Picture 38">
@@ -35023,7 +34842,7 @@
           <p:nvPr/>
         </p:nvPicPr>
         <p:blipFill>
-          <a:blip r:embed="rId26"/>
+          <a:blip r:embed="rId25"/>
           <a:stretch>
             <a:fillRect/>
           </a:stretch>
@@ -35053,7 +34872,7 @@
           <p:nvPr/>
         </p:nvPicPr>
         <p:blipFill>
-          <a:blip r:embed="rId27"/>
+          <a:blip r:embed="rId26"/>
           <a:stretch>
             <a:fillRect/>
           </a:stretch>
@@ -35083,14 +34902,14 @@
           <p:nvPr/>
         </p:nvPicPr>
         <p:blipFill>
-          <a:blip r:embed="rId28"/>
+          <a:blip r:embed="rId27"/>
           <a:stretch>
             <a:fillRect/>
           </a:stretch>
         </p:blipFill>
         <p:spPr>
           <a:xfrm>
-            <a:off x="235926" y="3221065"/>
+            <a:off x="243546" y="3221065"/>
             <a:ext cx="1514264" cy="4215553"/>
           </a:xfrm>
           <a:prstGeom prst="rect">
@@ -35113,7 +34932,7 @@
           <p:nvPr/>
         </p:nvPicPr>
         <p:blipFill rotWithShape="1">
-          <a:blip r:embed="rId29"/>
+          <a:blip r:embed="rId28"/>
           <a:srcRect t="4129"/>
           <a:stretch/>
         </p:blipFill>
@@ -35142,7 +34961,7 @@
           <p:nvPr/>
         </p:nvPicPr>
         <p:blipFill rotWithShape="1">
-          <a:blip r:embed="rId30">
+          <a:blip r:embed="rId29">
             <a:extLst>
               <a:ext uri="{28A0092B-C50C-407E-A947-70E740481C1C}">
                 <a14:useLocalDpi xmlns:a14="http://schemas.microsoft.com/office/drawing/2010/main" val="0"/>
@@ -35170,6 +34989,168 @@
               </a14:hiddenFill>
             </a:ext>
           </a:extLst>
+        </p:spPr>
+      </p:pic>
+      <p:sp>
+        <p:nvSpPr>
+          <p:cNvPr id="14" name="TextBox 13">
+            <a:extLst>
+              <a:ext uri="{FF2B5EF4-FFF2-40B4-BE49-F238E27FC236}">
+                <a16:creationId xmlns:a16="http://schemas.microsoft.com/office/drawing/2014/main" id="{544C2F9E-CCF0-A046-04DC-DB3B52649CD1}"/>
+              </a:ext>
+            </a:extLst>
+          </p:cNvPr>
+          <p:cNvSpPr txBox="1"/>
+          <p:nvPr/>
+        </p:nvSpPr>
+        <p:spPr>
+          <a:xfrm>
+            <a:off x="198045" y="7459588"/>
+            <a:ext cx="3162590" cy="492443"/>
+          </a:xfrm>
+          <a:prstGeom prst="rect">
+            <a:avLst/>
+          </a:prstGeom>
+          <a:noFill/>
+        </p:spPr>
+        <p:txBody>
+          <a:bodyPr wrap="square" rtlCol="0">
+            <a:spAutoFit/>
+          </a:bodyPr>
+          <a:lstStyle/>
+          <a:p>
+            <a:r>
+              <a:rPr lang="en-US" sz="1400" dirty="0">
+                <a:solidFill>
+                  <a:schemeClr val="bg1"/>
+                </a:solidFill>
+                <a:latin typeface="+mj-lt"/>
+              </a:rPr>
+              <a:t>API Parameter </a:t>
+            </a:r>
+            <a:endParaRPr lang="en-US" sz="1200" dirty="0">
+              <a:solidFill>
+                <a:schemeClr val="bg1"/>
+              </a:solidFill>
+              <a:latin typeface="+mj-lt"/>
+            </a:endParaRPr>
+          </a:p>
+          <a:p>
+            <a:r>
+              <a:rPr lang="en-US" sz="1200" dirty="0">
+                <a:solidFill>
+                  <a:schemeClr val="bg1"/>
+                </a:solidFill>
+                <a:latin typeface="+mj-lt"/>
+              </a:rPr>
+              <a:t>Prediction Accuracy</a:t>
+            </a:r>
+          </a:p>
+        </p:txBody>
+      </p:sp>
+      <p:graphicFrame>
+        <p:nvGraphicFramePr>
+          <p:cNvPr id="25" name="Chart 24">
+            <a:extLst>
+              <a:ext uri="{FF2B5EF4-FFF2-40B4-BE49-F238E27FC236}">
+                <a16:creationId xmlns:a16="http://schemas.microsoft.com/office/drawing/2014/main" id="{C3476443-D81B-17AA-5EC4-F6E1729BBE8B}"/>
+              </a:ext>
+            </a:extLst>
+          </p:cNvPr>
+          <p:cNvGraphicFramePr>
+            <a:graphicFrameLocks/>
+          </p:cNvGraphicFramePr>
+          <p:nvPr>
+            <p:extLst>
+              <p:ext uri="{D42A27DB-BD31-4B8C-83A1-F6EECF244321}">
+                <p14:modId xmlns:p14="http://schemas.microsoft.com/office/powerpoint/2010/main" val="727034699"/>
+              </p:ext>
+            </p:extLst>
+          </p:nvPr>
+        </p:nvGraphicFramePr>
+        <p:xfrm>
+          <a:off x="167263" y="7532332"/>
+          <a:ext cx="3844777" cy="2349822"/>
+        </p:xfrm>
+        <a:graphic>
+          <a:graphicData uri="http://schemas.openxmlformats.org/drawingml/2006/chart">
+            <c:chart xmlns:c="http://schemas.openxmlformats.org/drawingml/2006/chart" xmlns:r="http://schemas.openxmlformats.org/officeDocument/2006/relationships" r:id="rId30"/>
+          </a:graphicData>
+        </a:graphic>
+      </p:graphicFrame>
+      <p:sp>
+        <p:nvSpPr>
+          <p:cNvPr id="40" name="AutoShape 4" descr="Brand assets - Hugging Face">
+            <a:extLst>
+              <a:ext uri="{FF2B5EF4-FFF2-40B4-BE49-F238E27FC236}">
+                <a16:creationId xmlns:a16="http://schemas.microsoft.com/office/drawing/2014/main" id="{CF06C507-8735-58A4-F705-0A1A72608D9F}"/>
+              </a:ext>
+            </a:extLst>
+          </p:cNvPr>
+          <p:cNvSpPr>
+            <a:spLocks noChangeAspect="1" noChangeArrowheads="1"/>
+          </p:cNvSpPr>
+          <p:nvPr/>
+        </p:nvSpPr>
+        <p:spPr bwMode="auto">
+          <a:xfrm>
+            <a:off x="3733800" y="4876800"/>
+            <a:ext cx="304800" cy="304800"/>
+          </a:xfrm>
+          <a:prstGeom prst="rect">
+            <a:avLst/>
+          </a:prstGeom>
+          <a:noFill/>
+          <a:extLst>
+            <a:ext uri="{909E8E84-426E-40DD-AFC4-6F175D3DCCD1}">
+              <a14:hiddenFill xmlns:a14="http://schemas.microsoft.com/office/drawing/2010/main">
+                <a:solidFill>
+                  <a:srgbClr val="FFFFFF"/>
+                </a:solidFill>
+              </a14:hiddenFill>
+            </a:ext>
+          </a:extLst>
+        </p:spPr>
+        <p:txBody>
+          <a:bodyPr vert="horz" wrap="square" lIns="91440" tIns="45720" rIns="91440" bIns="45720" numCol="1" anchor="t" anchorCtr="0" compatLnSpc="1">
+            <a:prstTxWarp prst="textNoShape">
+              <a:avLst/>
+            </a:prstTxWarp>
+          </a:bodyPr>
+          <a:lstStyle/>
+          <a:p>
+            <a:endParaRPr lang="en-US"/>
+          </a:p>
+        </p:txBody>
+      </p:sp>
+      <p:pic>
+        <p:nvPicPr>
+          <p:cNvPr id="104" name="Picture 103">
+            <a:extLst>
+              <a:ext uri="{FF2B5EF4-FFF2-40B4-BE49-F238E27FC236}">
+                <a16:creationId xmlns:a16="http://schemas.microsoft.com/office/drawing/2014/main" id="{E0E9059C-C0DC-6D6C-71DA-70F08AE2A804}"/>
+              </a:ext>
+            </a:extLst>
+          </p:cNvPr>
+          <p:cNvPicPr>
+            <a:picLocks noChangeAspect="1"/>
+          </p:cNvPicPr>
+          <p:nvPr/>
+        </p:nvPicPr>
+        <p:blipFill>
+          <a:blip r:embed="rId31"/>
+          <a:stretch>
+            <a:fillRect/>
+          </a:stretch>
+        </p:blipFill>
+        <p:spPr>
+          <a:xfrm>
+            <a:off x="241777" y="3223516"/>
+            <a:ext cx="1507863" cy="4236072"/>
+          </a:xfrm>
+          <a:prstGeom prst="rect">
+            <a:avLst/>
+          </a:prstGeom>
         </p:spPr>
       </p:pic>
     </p:spTree>
@@ -61090,6 +61071,35 @@
 </file>
 
 <file path=customXml/item1.xml><?xml version="1.0" encoding="utf-8"?>
+<?mso-contentType ?>
+<FormTemplates xmlns="http://schemas.microsoft.com/sharepoint/v3/contenttype/forms">
+  <Display>DocumentLibraryForm</Display>
+  <Edit>DocumentLibraryForm</Edit>
+  <New>DocumentLibraryForm</New>
+</FormTemplates>
+</file>
+
+<file path=customXml/item2.xml><?xml version="1.0" encoding="utf-8"?>
+<p:properties xmlns:p="http://schemas.microsoft.com/office/2006/metadata/properties" xmlns:xsi="http://www.w3.org/2001/XMLSchema-instance" xmlns:pc="http://schemas.microsoft.com/office/infopath/2007/PartnerControls">
+  <documentManagement>
+    <_ip_UnifiedCompliancePolicyUIAction xmlns="http://schemas.microsoft.com/sharepoint/v3" xsi:nil="true"/>
+    <Image xmlns="71af3243-3dd4-4a8d-8c0d-dd76da1f02a5">
+      <Url xsi:nil="true"/>
+      <Description xsi:nil="true"/>
+    </Image>
+    <Status xmlns="71af3243-3dd4-4a8d-8c0d-dd76da1f02a5">Not started</Status>
+    <Background xmlns="71af3243-3dd4-4a8d-8c0d-dd76da1f02a5">false</Background>
+    <_ip_UnifiedCompliancePolicyProperties xmlns="http://schemas.microsoft.com/sharepoint/v3" xsi:nil="true"/>
+    <ImageTagsTaxHTField xmlns="71af3243-3dd4-4a8d-8c0d-dd76da1f02a5">
+      <Terms xmlns="http://schemas.microsoft.com/office/infopath/2007/PartnerControls"/>
+    </ImageTagsTaxHTField>
+    <TaxCatchAll xmlns="230e9df3-be65-4c73-a93b-d1236ebd677e" xsi:nil="true"/>
+    <MediaServiceKeyPoints xmlns="71af3243-3dd4-4a8d-8c0d-dd76da1f02a5" xsi:nil="true"/>
+  </documentManagement>
+</p:properties>
+</file>
+
+<file path=customXml/item3.xml><?xml version="1.0" encoding="utf-8"?>
 <ct:contentTypeSchema xmlns:ct="http://schemas.microsoft.com/office/2006/metadata/contentType" xmlns:ma="http://schemas.microsoft.com/office/2006/metadata/properties/metaAttributes" ct:_="" ma:_="" ma:contentTypeName="Document" ma:contentTypeID="0x01010079F111ED35F8CC479449609E8A0923A6" ma:contentTypeVersion="24" ma:contentTypeDescription="Create a new document." ma:contentTypeScope="" ma:versionID="2d714a3296df14eba7a100bb665443ca">
   <xsd:schema xmlns:xsd="http://www.w3.org/2001/XMLSchema" xmlns:xs="http://www.w3.org/2001/XMLSchema" xmlns:p="http://schemas.microsoft.com/office/2006/metadata/properties" xmlns:ns1="http://schemas.microsoft.com/sharepoint/v3" xmlns:ns2="71af3243-3dd4-4a8d-8c0d-dd76da1f02a5" xmlns:ns3="16c05727-aa75-4e4a-9b5f-8a80a1165891" xmlns:ns4="230e9df3-be65-4c73-a93b-d1236ebd677e" targetNamespace="http://schemas.microsoft.com/office/2006/metadata/properties" ma:root="true" ma:fieldsID="49549bf45bfbbfb6cffed527380e77e1" ns1:_="" ns2:_="" ns3:_="" ns4:_="">
     <xsd:import namespace="http://schemas.microsoft.com/sharepoint/v3"/>
@@ -61377,36 +61387,27 @@
 </ct:contentTypeSchema>
 </file>
 
-<file path=customXml/item2.xml><?xml version="1.0" encoding="utf-8"?>
-<p:properties xmlns:p="http://schemas.microsoft.com/office/2006/metadata/properties" xmlns:xsi="http://www.w3.org/2001/XMLSchema-instance" xmlns:pc="http://schemas.microsoft.com/office/infopath/2007/PartnerControls">
-  <documentManagement>
-    <_ip_UnifiedCompliancePolicyUIAction xmlns="http://schemas.microsoft.com/sharepoint/v3" xsi:nil="true"/>
-    <Image xmlns="71af3243-3dd4-4a8d-8c0d-dd76da1f02a5">
-      <Url xsi:nil="true"/>
-      <Description xsi:nil="true"/>
-    </Image>
-    <Status xmlns="71af3243-3dd4-4a8d-8c0d-dd76da1f02a5">Not started</Status>
-    <Background xmlns="71af3243-3dd4-4a8d-8c0d-dd76da1f02a5">false</Background>
-    <_ip_UnifiedCompliancePolicyProperties xmlns="http://schemas.microsoft.com/sharepoint/v3" xsi:nil="true"/>
-    <ImageTagsTaxHTField xmlns="71af3243-3dd4-4a8d-8c0d-dd76da1f02a5">
-      <Terms xmlns="http://schemas.microsoft.com/office/infopath/2007/PartnerControls"/>
-    </ImageTagsTaxHTField>
-    <TaxCatchAll xmlns="230e9df3-be65-4c73-a93b-d1236ebd677e" xsi:nil="true"/>
-    <MediaServiceKeyPoints xmlns="71af3243-3dd4-4a8d-8c0d-dd76da1f02a5" xsi:nil="true"/>
-  </documentManagement>
-</p:properties>
+<file path=customXml/itemProps1.xml><?xml version="1.0" encoding="utf-8"?>
+<ds:datastoreItem xmlns:ds="http://schemas.openxmlformats.org/officeDocument/2006/customXml" ds:itemID="{ED504F61-D355-45F4-88A1-A506DA0E4DAD}">
+  <ds:schemaRefs>
+    <ds:schemaRef ds:uri="http://schemas.microsoft.com/sharepoint/v3/contenttype/forms"/>
+  </ds:schemaRefs>
+</ds:datastoreItem>
 </file>
 
-<file path=customXml/item3.xml><?xml version="1.0" encoding="utf-8"?>
-<?mso-contentType ?>
-<FormTemplates xmlns="http://schemas.microsoft.com/sharepoint/v3/contenttype/forms">
-  <Display>DocumentLibraryForm</Display>
-  <Edit>DocumentLibraryForm</Edit>
-  <New>DocumentLibraryForm</New>
-</FormTemplates>
+<file path=customXml/itemProps2.xml><?xml version="1.0" encoding="utf-8"?>
+<ds:datastoreItem xmlns:ds="http://schemas.openxmlformats.org/officeDocument/2006/customXml" ds:itemID="{903CCD5C-1585-4363-9EFD-3AF69BA56376}">
+  <ds:schemaRefs>
+    <ds:schemaRef ds:uri="http://schemas.microsoft.com/office/2006/metadata/properties"/>
+    <ds:schemaRef ds:uri="http://schemas.microsoft.com/office/infopath/2007/PartnerControls"/>
+    <ds:schemaRef ds:uri="http://schemas.microsoft.com/sharepoint/v3"/>
+    <ds:schemaRef ds:uri="71af3243-3dd4-4a8d-8c0d-dd76da1f02a5"/>
+    <ds:schemaRef ds:uri="230e9df3-be65-4c73-a93b-d1236ebd677e"/>
+  </ds:schemaRefs>
+</ds:datastoreItem>
 </file>
 
-<file path=customXml/itemProps1.xml><?xml version="1.0" encoding="utf-8"?>
+<file path=customXml/itemProps3.xml><?xml version="1.0" encoding="utf-8"?>
 <ds:datastoreItem xmlns:ds="http://schemas.openxmlformats.org/officeDocument/2006/customXml" ds:itemID="{8966904C-BAED-4465-825E-748ECDB3F628}">
   <ds:schemaRefs>
     <ds:schemaRef ds:uri="http://schemas.microsoft.com/office/2006/metadata/contentType"/>
@@ -61425,24 +61426,4 @@
     <ds:schemaRef ds:uri="http://schemas.microsoft.com/internal/obd"/>
   </ds:schemaRefs>
 </ds:datastoreItem>
-</file>
-
-<file path=customXml/itemProps2.xml><?xml version="1.0" encoding="utf-8"?>
-<ds:datastoreItem xmlns:ds="http://schemas.openxmlformats.org/officeDocument/2006/customXml" ds:itemID="{903CCD5C-1585-4363-9EFD-3AF69BA56376}">
-  <ds:schemaRefs>
-    <ds:schemaRef ds:uri="http://schemas.microsoft.com/office/2006/metadata/properties"/>
-    <ds:schemaRef ds:uri="http://schemas.microsoft.com/office/infopath/2007/PartnerControls"/>
-    <ds:schemaRef ds:uri="http://schemas.microsoft.com/sharepoint/v3"/>
-    <ds:schemaRef ds:uri="71af3243-3dd4-4a8d-8c0d-dd76da1f02a5"/>
-    <ds:schemaRef ds:uri="230e9df3-be65-4c73-a93b-d1236ebd677e"/>
-  </ds:schemaRefs>
-</ds:datastoreItem>
-</file>
-
-<file path=customXml/itemProps3.xml><?xml version="1.0" encoding="utf-8"?>
-<ds:datastoreItem xmlns:ds="http://schemas.openxmlformats.org/officeDocument/2006/customXml" ds:itemID="{ED504F61-D355-45F4-88A1-A506DA0E4DAD}">
-  <ds:schemaRefs>
-    <ds:schemaRef ds:uri="http://schemas.microsoft.com/sharepoint/v3/contenttype/forms"/>
-  </ds:schemaRefs>
-</ds:datastoreItem>
 </file>
</xml_diff>

<commit_message>
Added NPS license information to readme & setup hugging face template
</commit_message>
<xml_diff>
--- a/01_documentation/nps_poster.pptx
+++ b/01_documentation/nps_poster.pptx
@@ -10670,7 +10670,7 @@
               <c:strCache>
                 <c:ptCount val="1"/>
                 <c:pt idx="0">
-                  <c:v>NLTK</c:v>
+                  <c:v>SpaCy</c:v>
                 </c:pt>
               </c:strCache>
             </c:strRef>
@@ -10715,7 +10715,7 @@
                   <c:v>0.27</c:v>
                 </c:pt>
                 <c:pt idx="2">
-                  <c:v>0.46</c:v>
+                  <c:v>0.56999999999999995</c:v>
                 </c:pt>
               </c:numCache>
             </c:numRef>
@@ -10735,7 +10735,7 @@
               <c:strCache>
                 <c:ptCount val="1"/>
                 <c:pt idx="0">
-                  <c:v>SpaCy</c:v>
+                  <c:v>TF-IDF</c:v>
                 </c:pt>
               </c:strCache>
             </c:strRef>
@@ -10774,13 +10774,13 @@
                 <c:formatCode>0%</c:formatCode>
                 <c:ptCount val="3"/>
                 <c:pt idx="0">
-                  <c:v>0.02</c:v>
+                  <c:v>0.93</c:v>
                 </c:pt>
                 <c:pt idx="1">
-                  <c:v>0.27</c:v>
+                  <c:v>0.86</c:v>
                 </c:pt>
                 <c:pt idx="2">
-                  <c:v>0.56999999999999995</c:v>
+                  <c:v>1</c:v>
                 </c:pt>
               </c:numCache>
             </c:numRef>
@@ -32083,7 +32083,7 @@
                   <a:schemeClr val="accent1"/>
                 </a:solidFill>
               </a:rPr>
-              <a:t>GPT Enabled Chatbot</a:t>
+              <a:t>NPS Chatbot</a:t>
             </a:r>
           </a:p>
         </p:txBody>
@@ -35063,7 +35063,7 @@
           <p:nvPr>
             <p:extLst>
               <p:ext uri="{D42A27DB-BD31-4B8C-83A1-F6EECF244321}">
-                <p14:modId xmlns:p14="http://schemas.microsoft.com/office/powerpoint/2010/main" val="727034699"/>
+                <p14:modId xmlns:p14="http://schemas.microsoft.com/office/powerpoint/2010/main" val="2767445339"/>
               </p:ext>
             </p:extLst>
           </p:nvPr>
@@ -61071,35 +61071,6 @@
 </file>
 
 <file path=customXml/item1.xml><?xml version="1.0" encoding="utf-8"?>
-<?mso-contentType ?>
-<FormTemplates xmlns="http://schemas.microsoft.com/sharepoint/v3/contenttype/forms">
-  <Display>DocumentLibraryForm</Display>
-  <Edit>DocumentLibraryForm</Edit>
-  <New>DocumentLibraryForm</New>
-</FormTemplates>
-</file>
-
-<file path=customXml/item2.xml><?xml version="1.0" encoding="utf-8"?>
-<p:properties xmlns:p="http://schemas.microsoft.com/office/2006/metadata/properties" xmlns:xsi="http://www.w3.org/2001/XMLSchema-instance" xmlns:pc="http://schemas.microsoft.com/office/infopath/2007/PartnerControls">
-  <documentManagement>
-    <_ip_UnifiedCompliancePolicyUIAction xmlns="http://schemas.microsoft.com/sharepoint/v3" xsi:nil="true"/>
-    <Image xmlns="71af3243-3dd4-4a8d-8c0d-dd76da1f02a5">
-      <Url xsi:nil="true"/>
-      <Description xsi:nil="true"/>
-    </Image>
-    <Status xmlns="71af3243-3dd4-4a8d-8c0d-dd76da1f02a5">Not started</Status>
-    <Background xmlns="71af3243-3dd4-4a8d-8c0d-dd76da1f02a5">false</Background>
-    <_ip_UnifiedCompliancePolicyProperties xmlns="http://schemas.microsoft.com/sharepoint/v3" xsi:nil="true"/>
-    <ImageTagsTaxHTField xmlns="71af3243-3dd4-4a8d-8c0d-dd76da1f02a5">
-      <Terms xmlns="http://schemas.microsoft.com/office/infopath/2007/PartnerControls"/>
-    </ImageTagsTaxHTField>
-    <TaxCatchAll xmlns="230e9df3-be65-4c73-a93b-d1236ebd677e" xsi:nil="true"/>
-    <MediaServiceKeyPoints xmlns="71af3243-3dd4-4a8d-8c0d-dd76da1f02a5" xsi:nil="true"/>
-  </documentManagement>
-</p:properties>
-</file>
-
-<file path=customXml/item3.xml><?xml version="1.0" encoding="utf-8"?>
 <ct:contentTypeSchema xmlns:ct="http://schemas.microsoft.com/office/2006/metadata/contentType" xmlns:ma="http://schemas.microsoft.com/office/2006/metadata/properties/metaAttributes" ct:_="" ma:_="" ma:contentTypeName="Document" ma:contentTypeID="0x01010079F111ED35F8CC479449609E8A0923A6" ma:contentTypeVersion="24" ma:contentTypeDescription="Create a new document." ma:contentTypeScope="" ma:versionID="2d714a3296df14eba7a100bb665443ca">
   <xsd:schema xmlns:xsd="http://www.w3.org/2001/XMLSchema" xmlns:xs="http://www.w3.org/2001/XMLSchema" xmlns:p="http://schemas.microsoft.com/office/2006/metadata/properties" xmlns:ns1="http://schemas.microsoft.com/sharepoint/v3" xmlns:ns2="71af3243-3dd4-4a8d-8c0d-dd76da1f02a5" xmlns:ns3="16c05727-aa75-4e4a-9b5f-8a80a1165891" xmlns:ns4="230e9df3-be65-4c73-a93b-d1236ebd677e" targetNamespace="http://schemas.microsoft.com/office/2006/metadata/properties" ma:root="true" ma:fieldsID="49549bf45bfbbfb6cffed527380e77e1" ns1:_="" ns2:_="" ns3:_="" ns4:_="">
     <xsd:import namespace="http://schemas.microsoft.com/sharepoint/v3"/>
@@ -61387,27 +61358,36 @@
 </ct:contentTypeSchema>
 </file>
 
-<file path=customXml/itemProps1.xml><?xml version="1.0" encoding="utf-8"?>
-<ds:datastoreItem xmlns:ds="http://schemas.openxmlformats.org/officeDocument/2006/customXml" ds:itemID="{ED504F61-D355-45F4-88A1-A506DA0E4DAD}">
-  <ds:schemaRefs>
-    <ds:schemaRef ds:uri="http://schemas.microsoft.com/sharepoint/v3/contenttype/forms"/>
-  </ds:schemaRefs>
-</ds:datastoreItem>
+<file path=customXml/item2.xml><?xml version="1.0" encoding="utf-8"?>
+<p:properties xmlns:p="http://schemas.microsoft.com/office/2006/metadata/properties" xmlns:xsi="http://www.w3.org/2001/XMLSchema-instance" xmlns:pc="http://schemas.microsoft.com/office/infopath/2007/PartnerControls">
+  <documentManagement>
+    <_ip_UnifiedCompliancePolicyUIAction xmlns="http://schemas.microsoft.com/sharepoint/v3" xsi:nil="true"/>
+    <Image xmlns="71af3243-3dd4-4a8d-8c0d-dd76da1f02a5">
+      <Url xsi:nil="true"/>
+      <Description xsi:nil="true"/>
+    </Image>
+    <Status xmlns="71af3243-3dd4-4a8d-8c0d-dd76da1f02a5">Not started</Status>
+    <Background xmlns="71af3243-3dd4-4a8d-8c0d-dd76da1f02a5">false</Background>
+    <_ip_UnifiedCompliancePolicyProperties xmlns="http://schemas.microsoft.com/sharepoint/v3" xsi:nil="true"/>
+    <ImageTagsTaxHTField xmlns="71af3243-3dd4-4a8d-8c0d-dd76da1f02a5">
+      <Terms xmlns="http://schemas.microsoft.com/office/infopath/2007/PartnerControls"/>
+    </ImageTagsTaxHTField>
+    <TaxCatchAll xmlns="230e9df3-be65-4c73-a93b-d1236ebd677e" xsi:nil="true"/>
+    <MediaServiceKeyPoints xmlns="71af3243-3dd4-4a8d-8c0d-dd76da1f02a5" xsi:nil="true"/>
+  </documentManagement>
+</p:properties>
 </file>
 
-<file path=customXml/itemProps2.xml><?xml version="1.0" encoding="utf-8"?>
-<ds:datastoreItem xmlns:ds="http://schemas.openxmlformats.org/officeDocument/2006/customXml" ds:itemID="{903CCD5C-1585-4363-9EFD-3AF69BA56376}">
-  <ds:schemaRefs>
-    <ds:schemaRef ds:uri="http://schemas.microsoft.com/office/2006/metadata/properties"/>
-    <ds:schemaRef ds:uri="http://schemas.microsoft.com/office/infopath/2007/PartnerControls"/>
-    <ds:schemaRef ds:uri="http://schemas.microsoft.com/sharepoint/v3"/>
-    <ds:schemaRef ds:uri="71af3243-3dd4-4a8d-8c0d-dd76da1f02a5"/>
-    <ds:schemaRef ds:uri="230e9df3-be65-4c73-a93b-d1236ebd677e"/>
-  </ds:schemaRefs>
-</ds:datastoreItem>
+<file path=customXml/item3.xml><?xml version="1.0" encoding="utf-8"?>
+<?mso-contentType ?>
+<FormTemplates xmlns="http://schemas.microsoft.com/sharepoint/v3/contenttype/forms">
+  <Display>DocumentLibraryForm</Display>
+  <Edit>DocumentLibraryForm</Edit>
+  <New>DocumentLibraryForm</New>
+</FormTemplates>
 </file>
 
-<file path=customXml/itemProps3.xml><?xml version="1.0" encoding="utf-8"?>
+<file path=customXml/itemProps1.xml><?xml version="1.0" encoding="utf-8"?>
 <ds:datastoreItem xmlns:ds="http://schemas.openxmlformats.org/officeDocument/2006/customXml" ds:itemID="{8966904C-BAED-4465-825E-748ECDB3F628}">
   <ds:schemaRefs>
     <ds:schemaRef ds:uri="http://schemas.microsoft.com/office/2006/metadata/contentType"/>
@@ -61426,4 +61406,24 @@
     <ds:schemaRef ds:uri="http://schemas.microsoft.com/internal/obd"/>
   </ds:schemaRefs>
 </ds:datastoreItem>
+</file>
+
+<file path=customXml/itemProps2.xml><?xml version="1.0" encoding="utf-8"?>
+<ds:datastoreItem xmlns:ds="http://schemas.openxmlformats.org/officeDocument/2006/customXml" ds:itemID="{903CCD5C-1585-4363-9EFD-3AF69BA56376}">
+  <ds:schemaRefs>
+    <ds:schemaRef ds:uri="http://schemas.microsoft.com/office/2006/metadata/properties"/>
+    <ds:schemaRef ds:uri="http://schemas.microsoft.com/office/infopath/2007/PartnerControls"/>
+    <ds:schemaRef ds:uri="http://schemas.microsoft.com/sharepoint/v3"/>
+    <ds:schemaRef ds:uri="71af3243-3dd4-4a8d-8c0d-dd76da1f02a5"/>
+    <ds:schemaRef ds:uri="230e9df3-be65-4c73-a93b-d1236ebd677e"/>
+  </ds:schemaRefs>
+</ds:datastoreItem>
+</file>
+
+<file path=customXml/itemProps3.xml><?xml version="1.0" encoding="utf-8"?>
+<ds:datastoreItem xmlns:ds="http://schemas.openxmlformats.org/officeDocument/2006/customXml" ds:itemID="{ED504F61-D355-45F4-88A1-A506DA0E4DAD}">
+  <ds:schemaRefs>
+    <ds:schemaRef ds:uri="http://schemas.microsoft.com/sharepoint/v3/contenttype/forms"/>
+  </ds:schemaRefs>
+</ds:datastoreItem>
 </file>
</xml_diff>